<commit_message>
Document edits and Gantt chart
</commit_message>
<xml_diff>
--- a/Button Mash Master.pptx
+++ b/Button Mash Master.pptx
@@ -10,8 +10,10 @@
     <p:sldId id="258" r:id="rId4"/>
     <p:sldId id="259" r:id="rId5"/>
     <p:sldId id="261" r:id="rId6"/>
-    <p:sldId id="263" r:id="rId7"/>
-    <p:sldId id="265" r:id="rId8"/>
+    <p:sldId id="267" r:id="rId7"/>
+    <p:sldId id="266" r:id="rId8"/>
+    <p:sldId id="263" r:id="rId9"/>
+    <p:sldId id="265" r:id="rId10"/>
   </p:sldIdLst>
   <p:sldSz cx="9144000" cy="6858000" type="screen4x3"/>
   <p:notesSz cx="6858000" cy="9144000"/>
@@ -110,6 +112,22 @@
       </a:defRPr>
     </a:lvl9pPr>
   </p:defaultTextStyle>
+  <p:extLst>
+    <p:ext uri="{EFAFB233-063F-42B5-8137-9DF3F51BA10A}">
+      <p15:sldGuideLst xmlns:p15="http://schemas.microsoft.com/office/powerpoint/2012/main">
+        <p15:guide id="1" orient="horz" pos="2160">
+          <p15:clr>
+            <a:srgbClr val="A4A3A4"/>
+          </p15:clr>
+        </p15:guide>
+        <p15:guide id="2" pos="2880">
+          <p15:clr>
+            <a:srgbClr val="A4A3A4"/>
+          </p15:clr>
+        </p15:guide>
+      </p15:sldGuideLst>
+    </p:ext>
+  </p:extLst>
 </p:presentation>
 </file>
 
@@ -7115,6 +7133,13 @@
     <a:masterClrMapping/>
   </p:clrMapOvr>
   <p:transition/>
+  <p:timing>
+    <p:tnLst>
+      <p:par>
+        <p:cTn id="1" dur="indefinite" restart="never" nodeType="tmRoot"/>
+      </p:par>
+    </p:tnLst>
+  </p:timing>
 </p:sld>
 </file>
 
@@ -7270,6 +7295,13 @@
     <a:masterClrMapping/>
   </p:clrMapOvr>
   <p:transition/>
+  <p:timing>
+    <p:tnLst>
+      <p:par>
+        <p:cTn id="1" dur="indefinite" restart="never" nodeType="tmRoot"/>
+      </p:par>
+    </p:tnLst>
+  </p:timing>
 </p:sld>
 </file>
 
@@ -7330,33 +7362,35 @@
         </p:nvSpPr>
         <p:spPr>
           <a:xfrm>
-            <a:off x="457200" y="1752600"/>
-            <a:ext cx="8458200" cy="4724400"/>
-          </a:xfrm>
-        </p:spPr>
-        <p:txBody>
-          <a:bodyPr/>
+            <a:off x="457200" y="2133600"/>
+            <a:ext cx="8458200" cy="4343400"/>
+          </a:xfrm>
+        </p:spPr>
+        <p:txBody>
+          <a:bodyPr>
+            <a:normAutofit/>
+          </a:bodyPr>
           <a:lstStyle/>
           <a:p>
             <a:pPr algn="l"/>
             <a:r>
-              <a:rPr lang="en-US" dirty="0" smtClean="0"/>
+              <a:rPr lang="en-US" sz="2500" dirty="0" smtClean="0"/>
               <a:t>Button Mash Master </a:t>
             </a:r>
             <a:r>
-              <a:rPr lang="en-US" dirty="0" smtClean="0">
+              <a:rPr lang="en-US" sz="2500" dirty="0" smtClean="0">
                 <a:effectLst/>
               </a:rPr>
               <a:t>comprises of </a:t>
             </a:r>
             <a:r>
-              <a:rPr lang="en-US" dirty="0">
+              <a:rPr lang="en-US" sz="2500" dirty="0">
                 <a:effectLst/>
               </a:rPr>
               <a:t>playing through a wide variety of competitive </a:t>
             </a:r>
             <a:r>
-              <a:rPr lang="en-US" dirty="0" smtClean="0">
+              <a:rPr lang="en-US" sz="2500" dirty="0" smtClean="0">
                 <a:effectLst/>
               </a:rPr>
               <a:t>minigames.</a:t>
@@ -7364,39 +7398,61 @@
           </a:p>
           <a:p>
             <a:pPr algn="l"/>
-            <a:r>
-              <a:rPr lang="en-US" dirty="0" smtClean="0"/>
-              <a:t>It has simple game controls which comprises of the left, up and right buttons. </a:t>
-            </a:r>
+            <a:endParaRPr lang="en-US" sz="2500" dirty="0" smtClean="0"/>
           </a:p>
           <a:p>
             <a:pPr algn="l"/>
             <a:r>
-              <a:rPr lang="en-US" dirty="0" smtClean="0">
+              <a:rPr lang="en-US" sz="2500" dirty="0" smtClean="0"/>
+              <a:t>It </a:t>
+            </a:r>
+            <a:r>
+              <a:rPr lang="en-US" sz="2500" dirty="0" smtClean="0"/>
+              <a:t>has simple game controls which comprises of the left, </a:t>
+            </a:r>
+            <a:r>
+              <a:rPr lang="en-US" sz="2500" dirty="0" smtClean="0"/>
+              <a:t>down and </a:t>
+            </a:r>
+            <a:r>
+              <a:rPr lang="en-US" sz="2500" dirty="0" smtClean="0"/>
+              <a:t>right buttons. </a:t>
+            </a:r>
+          </a:p>
+          <a:p>
+            <a:pPr algn="l"/>
+            <a:endParaRPr lang="en-US" sz="2500" dirty="0" smtClean="0">
+              <a:effectLst/>
+            </a:endParaRPr>
+          </a:p>
+          <a:p>
+            <a:pPr algn="l"/>
+            <a:r>
+              <a:rPr lang="en-US" sz="2500" dirty="0" smtClean="0">
                 <a:effectLst/>
               </a:rPr>
               <a:t>Each </a:t>
             </a:r>
             <a:r>
-              <a:rPr lang="en-US" dirty="0">
+              <a:rPr lang="en-US" sz="2500" dirty="0">
                 <a:effectLst/>
               </a:rPr>
               <a:t>minigame explains its </a:t>
             </a:r>
             <a:r>
-              <a:rPr lang="en-US" dirty="0" smtClean="0">
+              <a:rPr lang="en-US" sz="2500" dirty="0" smtClean="0">
                 <a:effectLst/>
               </a:rPr>
               <a:t>rules &amp; controls </a:t>
             </a:r>
             <a:r>
-              <a:rPr lang="en-US" dirty="0">
+              <a:rPr lang="en-US" sz="2500" dirty="0">
                 <a:effectLst/>
               </a:rPr>
               <a:t>before </a:t>
             </a:r>
             <a:r>
-              <a:rPr lang="en-US" dirty="0" smtClean="0">
+              <a:rPr lang="en-US" sz="2500" dirty="0" smtClean="0">
                 <a:effectLst/>
               </a:rPr>
               <a:t>playing commences.</a:t>
@@ -7404,13 +7460,13 @@
           </a:p>
           <a:p>
             <a:pPr algn="l"/>
-            <a:endParaRPr lang="en-US" dirty="0">
+            <a:endParaRPr lang="en-US" sz="2500" dirty="0">
               <a:effectLst/>
             </a:endParaRPr>
           </a:p>
           <a:p>
             <a:pPr algn="l"/>
-            <a:endParaRPr lang="en-US" dirty="0" smtClean="0"/>
+            <a:endParaRPr lang="en-US" sz="2500" dirty="0" smtClean="0"/>
           </a:p>
         </p:txBody>
       </p:sp>
@@ -7425,6 +7481,219 @@
     <a:masterClrMapping/>
   </p:clrMapOvr>
   <p:transition/>
+  <p:timing>
+    <p:tnLst>
+      <p:par>
+        <p:cTn id="1" dur="indefinite" restart="never" nodeType="tmRoot">
+          <p:childTnLst>
+            <p:seq concurrent="1" nextAc="seek">
+              <p:cTn id="2" dur="indefinite" nodeType="mainSeq">
+                <p:childTnLst>
+                  <p:par>
+                    <p:cTn id="3" fill="hold">
+                      <p:stCondLst>
+                        <p:cond delay="indefinite"/>
+                      </p:stCondLst>
+                      <p:childTnLst>
+                        <p:par>
+                          <p:cTn id="4" fill="hold">
+                            <p:stCondLst>
+                              <p:cond delay="0"/>
+                            </p:stCondLst>
+                            <p:childTnLst>
+                              <p:par>
+                                <p:cTn id="5" presetID="10" presetClass="entr" presetSubtype="0" fill="hold" nodeType="clickEffect">
+                                  <p:stCondLst>
+                                    <p:cond delay="0"/>
+                                  </p:stCondLst>
+                                  <p:childTnLst>
+                                    <p:set>
+                                      <p:cBhvr>
+                                        <p:cTn id="6" dur="1" fill="hold">
+                                          <p:stCondLst>
+                                            <p:cond delay="0"/>
+                                          </p:stCondLst>
+                                        </p:cTn>
+                                        <p:tgtEl>
+                                          <p:spTgt spid="6">
+                                            <p:txEl>
+                                              <p:pRg st="0" end="0"/>
+                                            </p:txEl>
+                                          </p:spTgt>
+                                        </p:tgtEl>
+                                        <p:attrNameLst>
+                                          <p:attrName>style.visibility</p:attrName>
+                                        </p:attrNameLst>
+                                      </p:cBhvr>
+                                      <p:to>
+                                        <p:strVal val="visible"/>
+                                      </p:to>
+                                    </p:set>
+                                    <p:animEffect transition="in" filter="fade">
+                                      <p:cBhvr>
+                                        <p:cTn id="7" dur="500"/>
+                                        <p:tgtEl>
+                                          <p:spTgt spid="6">
+                                            <p:txEl>
+                                              <p:pRg st="0" end="0"/>
+                                            </p:txEl>
+                                          </p:spTgt>
+                                        </p:tgtEl>
+                                      </p:cBhvr>
+                                    </p:animEffect>
+                                  </p:childTnLst>
+                                </p:cTn>
+                              </p:par>
+                            </p:childTnLst>
+                          </p:cTn>
+                        </p:par>
+                      </p:childTnLst>
+                    </p:cTn>
+                  </p:par>
+                  <p:par>
+                    <p:cTn id="8" fill="hold">
+                      <p:stCondLst>
+                        <p:cond delay="indefinite"/>
+                      </p:stCondLst>
+                      <p:childTnLst>
+                        <p:par>
+                          <p:cTn id="9" fill="hold">
+                            <p:stCondLst>
+                              <p:cond delay="0"/>
+                            </p:stCondLst>
+                            <p:childTnLst>
+                              <p:par>
+                                <p:cTn id="10" presetID="10" presetClass="entr" presetSubtype="0" fill="hold" nodeType="clickEffect">
+                                  <p:stCondLst>
+                                    <p:cond delay="0"/>
+                                  </p:stCondLst>
+                                  <p:childTnLst>
+                                    <p:set>
+                                      <p:cBhvr>
+                                        <p:cTn id="11" dur="1" fill="hold">
+                                          <p:stCondLst>
+                                            <p:cond delay="0"/>
+                                          </p:stCondLst>
+                                        </p:cTn>
+                                        <p:tgtEl>
+                                          <p:spTgt spid="6">
+                                            <p:txEl>
+                                              <p:pRg st="2" end="2"/>
+                                            </p:txEl>
+                                          </p:spTgt>
+                                        </p:tgtEl>
+                                        <p:attrNameLst>
+                                          <p:attrName>style.visibility</p:attrName>
+                                        </p:attrNameLst>
+                                      </p:cBhvr>
+                                      <p:to>
+                                        <p:strVal val="visible"/>
+                                      </p:to>
+                                    </p:set>
+                                    <p:animEffect transition="in" filter="fade">
+                                      <p:cBhvr>
+                                        <p:cTn id="12" dur="500"/>
+                                        <p:tgtEl>
+                                          <p:spTgt spid="6">
+                                            <p:txEl>
+                                              <p:pRg st="2" end="2"/>
+                                            </p:txEl>
+                                          </p:spTgt>
+                                        </p:tgtEl>
+                                      </p:cBhvr>
+                                    </p:animEffect>
+                                  </p:childTnLst>
+                                </p:cTn>
+                              </p:par>
+                            </p:childTnLst>
+                          </p:cTn>
+                        </p:par>
+                      </p:childTnLst>
+                    </p:cTn>
+                  </p:par>
+                  <p:par>
+                    <p:cTn id="13" fill="hold">
+                      <p:stCondLst>
+                        <p:cond delay="indefinite"/>
+                      </p:stCondLst>
+                      <p:childTnLst>
+                        <p:par>
+                          <p:cTn id="14" fill="hold">
+                            <p:stCondLst>
+                              <p:cond delay="0"/>
+                            </p:stCondLst>
+                            <p:childTnLst>
+                              <p:par>
+                                <p:cTn id="15" presetID="10" presetClass="entr" presetSubtype="0" fill="hold" nodeType="clickEffect">
+                                  <p:stCondLst>
+                                    <p:cond delay="0"/>
+                                  </p:stCondLst>
+                                  <p:childTnLst>
+                                    <p:set>
+                                      <p:cBhvr>
+                                        <p:cTn id="16" dur="1" fill="hold">
+                                          <p:stCondLst>
+                                            <p:cond delay="0"/>
+                                          </p:stCondLst>
+                                        </p:cTn>
+                                        <p:tgtEl>
+                                          <p:spTgt spid="6">
+                                            <p:txEl>
+                                              <p:pRg st="4" end="4"/>
+                                            </p:txEl>
+                                          </p:spTgt>
+                                        </p:tgtEl>
+                                        <p:attrNameLst>
+                                          <p:attrName>style.visibility</p:attrName>
+                                        </p:attrNameLst>
+                                      </p:cBhvr>
+                                      <p:to>
+                                        <p:strVal val="visible"/>
+                                      </p:to>
+                                    </p:set>
+                                    <p:animEffect transition="in" filter="fade">
+                                      <p:cBhvr>
+                                        <p:cTn id="17" dur="500"/>
+                                        <p:tgtEl>
+                                          <p:spTgt spid="6">
+                                            <p:txEl>
+                                              <p:pRg st="4" end="4"/>
+                                            </p:txEl>
+                                          </p:spTgt>
+                                        </p:tgtEl>
+                                      </p:cBhvr>
+                                    </p:animEffect>
+                                  </p:childTnLst>
+                                </p:cTn>
+                              </p:par>
+                            </p:childTnLst>
+                          </p:cTn>
+                        </p:par>
+                      </p:childTnLst>
+                    </p:cTn>
+                  </p:par>
+                </p:childTnLst>
+              </p:cTn>
+              <p:prevCondLst>
+                <p:cond evt="onPrev" delay="0">
+                  <p:tgtEl>
+                    <p:sldTgt/>
+                  </p:tgtEl>
+                </p:cond>
+              </p:prevCondLst>
+              <p:nextCondLst>
+                <p:cond evt="onNext" delay="0">
+                  <p:tgtEl>
+                    <p:sldTgt/>
+                  </p:tgtEl>
+                </p:cond>
+              </p:nextCondLst>
+            </p:seq>
+          </p:childTnLst>
+        </p:cTn>
+      </p:par>
+    </p:tnLst>
+  </p:timing>
 </p:sld>
 </file>
 
@@ -7549,6 +7818,13 @@
     <a:masterClrMapping/>
   </p:clrMapOvr>
   <p:transition/>
+  <p:timing>
+    <p:tnLst>
+      <p:par>
+        <p:cTn id="1" dur="indefinite" restart="never" nodeType="tmRoot"/>
+      </p:par>
+    </p:tnLst>
+  </p:timing>
 </p:sld>
 </file>
 
@@ -7612,12 +7888,14 @@
         </p:nvSpPr>
         <p:spPr>
           <a:xfrm>
-            <a:off x="1295400" y="1752600"/>
+            <a:off x="1280110" y="1981200"/>
             <a:ext cx="6111290" cy="3927806"/>
           </a:xfrm>
         </p:spPr>
         <p:txBody>
-          <a:bodyPr/>
+          <a:bodyPr>
+            <a:normAutofit/>
+          </a:bodyPr>
           <a:lstStyle/>
           <a:p>
             <a:pPr marL="285750" indent="-285750" algn="l">
@@ -7625,10 +7903,9 @@
               <a:buChar char="•"/>
             </a:pPr>
             <a:r>
-              <a:rPr lang="en-US" dirty="0" smtClean="0"/>
+              <a:rPr lang="en-US" sz="2500" dirty="0" smtClean="0"/>
               <a:t>Normal mode/Random mode</a:t>
             </a:r>
-            <a:endParaRPr lang="en-US" dirty="0" smtClean="0"/>
           </a:p>
           <a:p>
             <a:pPr marL="285750" indent="-285750" algn="l">
@@ -7636,12 +7913,8 @@
               <a:buChar char="•"/>
             </a:pPr>
             <a:r>
-              <a:rPr lang="en-US" dirty="0" smtClean="0"/>
-              <a:t>Ranks </a:t>
-            </a:r>
-            <a:r>
-              <a:rPr lang="en-US" dirty="0" smtClean="0"/>
-              <a:t>for each minigame</a:t>
+              <a:rPr lang="en-US" sz="2500" dirty="0" smtClean="0"/>
+              <a:t>Ranks for each minigame</a:t>
             </a:r>
           </a:p>
           <a:p>
@@ -7650,14 +7923,9 @@
               <a:buChar char="•"/>
             </a:pPr>
             <a:r>
-              <a:rPr lang="en-US" dirty="0" smtClean="0"/>
-              <a:t>High-Score </a:t>
-            </a:r>
-            <a:r>
-              <a:rPr lang="en-US" dirty="0" smtClean="0"/>
-              <a:t>System</a:t>
-            </a:r>
-            <a:endParaRPr lang="en-US" dirty="0" smtClean="0"/>
+              <a:rPr lang="en-US" sz="2500" dirty="0" smtClean="0"/>
+              <a:t>High-Score System</a:t>
+            </a:r>
           </a:p>
           <a:p>
             <a:pPr marL="285750" indent="-285750" algn="l">
@@ -7665,8 +7933,8 @@
               <a:buChar char="•"/>
             </a:pPr>
             <a:r>
-              <a:rPr lang="en-US" dirty="0" smtClean="0"/>
-              <a:t>Sprite animations loaded from txt file</a:t>
+              <a:rPr lang="en-US" sz="2500" dirty="0" smtClean="0"/>
+              <a:t>ASCII sprite animations loaded from txt file</a:t>
             </a:r>
           </a:p>
           <a:p>
@@ -7675,24 +7943,25 @@
               <a:buChar char="•"/>
             </a:pPr>
             <a:r>
-              <a:rPr lang="en-US" dirty="0" smtClean="0"/>
-              <a:t>Unique Game Controls</a:t>
-            </a:r>
-            <a:endParaRPr lang="en-US" dirty="0"/>
-          </a:p>
-          <a:p>
-            <a:pPr marL="285750" indent="-285750" algn="l">
-              <a:buFont typeface="Arial" panose="020B0604020202020204" pitchFamily="34" charset="0"/>
-              <a:buChar char="•"/>
-            </a:pPr>
-            <a:endParaRPr lang="en-US" dirty="0" smtClean="0"/>
-          </a:p>
-          <a:p>
-            <a:pPr marL="285750" indent="-285750" algn="l">
-              <a:buFont typeface="Arial" panose="020B0604020202020204" pitchFamily="34" charset="0"/>
-              <a:buChar char="•"/>
-            </a:pPr>
-            <a:endParaRPr lang="en-US" dirty="0"/>
+              <a:rPr lang="en-US" sz="2500" dirty="0" smtClean="0"/>
+              <a:t>Unique Game Controls – Capture key triggered instead of </a:t>
+            </a:r>
+            <a:r>
+              <a:rPr lang="en-US" sz="2500" dirty="0"/>
+              <a:t>k</a:t>
+            </a:r>
+            <a:r>
+              <a:rPr lang="en-US" sz="2500" dirty="0" smtClean="0"/>
+              <a:t>ey </a:t>
+            </a:r>
+            <a:r>
+              <a:rPr lang="en-US" sz="2500" dirty="0"/>
+              <a:t>p</a:t>
+            </a:r>
+            <a:r>
+              <a:rPr lang="en-US" sz="2500" dirty="0" smtClean="0"/>
+              <a:t>ressed.</a:t>
+            </a:r>
           </a:p>
         </p:txBody>
       </p:sp>
@@ -7707,6 +7976,341 @@
     <a:masterClrMapping/>
   </p:clrMapOvr>
   <p:transition/>
+  <p:timing>
+    <p:tnLst>
+      <p:par>
+        <p:cTn id="1" dur="indefinite" restart="never" nodeType="tmRoot">
+          <p:childTnLst>
+            <p:seq concurrent="1" nextAc="seek">
+              <p:cTn id="2" dur="indefinite" nodeType="mainSeq">
+                <p:childTnLst>
+                  <p:par>
+                    <p:cTn id="3" fill="hold">
+                      <p:stCondLst>
+                        <p:cond delay="indefinite"/>
+                      </p:stCondLst>
+                      <p:childTnLst>
+                        <p:par>
+                          <p:cTn id="4" fill="hold">
+                            <p:stCondLst>
+                              <p:cond delay="0"/>
+                            </p:stCondLst>
+                            <p:childTnLst>
+                              <p:par>
+                                <p:cTn id="5" presetID="10" presetClass="entr" presetSubtype="0" fill="hold" nodeType="clickEffect">
+                                  <p:stCondLst>
+                                    <p:cond delay="0"/>
+                                  </p:stCondLst>
+                                  <p:childTnLst>
+                                    <p:set>
+                                      <p:cBhvr>
+                                        <p:cTn id="6" dur="1" fill="hold">
+                                          <p:stCondLst>
+                                            <p:cond delay="0"/>
+                                          </p:stCondLst>
+                                        </p:cTn>
+                                        <p:tgtEl>
+                                          <p:spTgt spid="4">
+                                            <p:txEl>
+                                              <p:pRg st="0" end="0"/>
+                                            </p:txEl>
+                                          </p:spTgt>
+                                        </p:tgtEl>
+                                        <p:attrNameLst>
+                                          <p:attrName>style.visibility</p:attrName>
+                                        </p:attrNameLst>
+                                      </p:cBhvr>
+                                      <p:to>
+                                        <p:strVal val="visible"/>
+                                      </p:to>
+                                    </p:set>
+                                    <p:animEffect transition="in" filter="fade">
+                                      <p:cBhvr>
+                                        <p:cTn id="7" dur="500"/>
+                                        <p:tgtEl>
+                                          <p:spTgt spid="4">
+                                            <p:txEl>
+                                              <p:pRg st="0" end="0"/>
+                                            </p:txEl>
+                                          </p:spTgt>
+                                        </p:tgtEl>
+                                      </p:cBhvr>
+                                    </p:animEffect>
+                                  </p:childTnLst>
+                                </p:cTn>
+                              </p:par>
+                            </p:childTnLst>
+                          </p:cTn>
+                        </p:par>
+                      </p:childTnLst>
+                    </p:cTn>
+                  </p:par>
+                  <p:par>
+                    <p:cTn id="8" fill="hold">
+                      <p:stCondLst>
+                        <p:cond delay="indefinite"/>
+                      </p:stCondLst>
+                      <p:childTnLst>
+                        <p:par>
+                          <p:cTn id="9" fill="hold">
+                            <p:stCondLst>
+                              <p:cond delay="0"/>
+                            </p:stCondLst>
+                            <p:childTnLst>
+                              <p:par>
+                                <p:cTn id="10" presetID="10" presetClass="entr" presetSubtype="0" fill="hold" nodeType="clickEffect">
+                                  <p:stCondLst>
+                                    <p:cond delay="0"/>
+                                  </p:stCondLst>
+                                  <p:childTnLst>
+                                    <p:set>
+                                      <p:cBhvr>
+                                        <p:cTn id="11" dur="1" fill="hold">
+                                          <p:stCondLst>
+                                            <p:cond delay="0"/>
+                                          </p:stCondLst>
+                                        </p:cTn>
+                                        <p:tgtEl>
+                                          <p:spTgt spid="4">
+                                            <p:txEl>
+                                              <p:pRg st="1" end="1"/>
+                                            </p:txEl>
+                                          </p:spTgt>
+                                        </p:tgtEl>
+                                        <p:attrNameLst>
+                                          <p:attrName>style.visibility</p:attrName>
+                                        </p:attrNameLst>
+                                      </p:cBhvr>
+                                      <p:to>
+                                        <p:strVal val="visible"/>
+                                      </p:to>
+                                    </p:set>
+                                    <p:animEffect transition="in" filter="fade">
+                                      <p:cBhvr>
+                                        <p:cTn id="12" dur="500"/>
+                                        <p:tgtEl>
+                                          <p:spTgt spid="4">
+                                            <p:txEl>
+                                              <p:pRg st="1" end="1"/>
+                                            </p:txEl>
+                                          </p:spTgt>
+                                        </p:tgtEl>
+                                      </p:cBhvr>
+                                    </p:animEffect>
+                                  </p:childTnLst>
+                                </p:cTn>
+                              </p:par>
+                            </p:childTnLst>
+                          </p:cTn>
+                        </p:par>
+                      </p:childTnLst>
+                    </p:cTn>
+                  </p:par>
+                  <p:par>
+                    <p:cTn id="13" fill="hold">
+                      <p:stCondLst>
+                        <p:cond delay="indefinite"/>
+                      </p:stCondLst>
+                      <p:childTnLst>
+                        <p:par>
+                          <p:cTn id="14" fill="hold">
+                            <p:stCondLst>
+                              <p:cond delay="0"/>
+                            </p:stCondLst>
+                            <p:childTnLst>
+                              <p:par>
+                                <p:cTn id="15" presetID="10" presetClass="entr" presetSubtype="0" fill="hold" nodeType="clickEffect">
+                                  <p:stCondLst>
+                                    <p:cond delay="0"/>
+                                  </p:stCondLst>
+                                  <p:childTnLst>
+                                    <p:set>
+                                      <p:cBhvr>
+                                        <p:cTn id="16" dur="1" fill="hold">
+                                          <p:stCondLst>
+                                            <p:cond delay="0"/>
+                                          </p:stCondLst>
+                                        </p:cTn>
+                                        <p:tgtEl>
+                                          <p:spTgt spid="4">
+                                            <p:txEl>
+                                              <p:pRg st="2" end="2"/>
+                                            </p:txEl>
+                                          </p:spTgt>
+                                        </p:tgtEl>
+                                        <p:attrNameLst>
+                                          <p:attrName>style.visibility</p:attrName>
+                                        </p:attrNameLst>
+                                      </p:cBhvr>
+                                      <p:to>
+                                        <p:strVal val="visible"/>
+                                      </p:to>
+                                    </p:set>
+                                    <p:animEffect transition="in" filter="fade">
+                                      <p:cBhvr>
+                                        <p:cTn id="17" dur="500"/>
+                                        <p:tgtEl>
+                                          <p:spTgt spid="4">
+                                            <p:txEl>
+                                              <p:pRg st="2" end="2"/>
+                                            </p:txEl>
+                                          </p:spTgt>
+                                        </p:tgtEl>
+                                      </p:cBhvr>
+                                    </p:animEffect>
+                                  </p:childTnLst>
+                                </p:cTn>
+                              </p:par>
+                            </p:childTnLst>
+                          </p:cTn>
+                        </p:par>
+                      </p:childTnLst>
+                    </p:cTn>
+                  </p:par>
+                  <p:par>
+                    <p:cTn id="18" fill="hold">
+                      <p:stCondLst>
+                        <p:cond delay="indefinite"/>
+                      </p:stCondLst>
+                      <p:childTnLst>
+                        <p:par>
+                          <p:cTn id="19" fill="hold">
+                            <p:stCondLst>
+                              <p:cond delay="0"/>
+                            </p:stCondLst>
+                            <p:childTnLst>
+                              <p:par>
+                                <p:cTn id="20" presetID="10" presetClass="entr" presetSubtype="0" fill="hold" nodeType="clickEffect">
+                                  <p:stCondLst>
+                                    <p:cond delay="0"/>
+                                  </p:stCondLst>
+                                  <p:childTnLst>
+                                    <p:set>
+                                      <p:cBhvr>
+                                        <p:cTn id="21" dur="1" fill="hold">
+                                          <p:stCondLst>
+                                            <p:cond delay="0"/>
+                                          </p:stCondLst>
+                                        </p:cTn>
+                                        <p:tgtEl>
+                                          <p:spTgt spid="4">
+                                            <p:txEl>
+                                              <p:pRg st="3" end="3"/>
+                                            </p:txEl>
+                                          </p:spTgt>
+                                        </p:tgtEl>
+                                        <p:attrNameLst>
+                                          <p:attrName>style.visibility</p:attrName>
+                                        </p:attrNameLst>
+                                      </p:cBhvr>
+                                      <p:to>
+                                        <p:strVal val="visible"/>
+                                      </p:to>
+                                    </p:set>
+                                    <p:animEffect transition="in" filter="fade">
+                                      <p:cBhvr>
+                                        <p:cTn id="22" dur="500"/>
+                                        <p:tgtEl>
+                                          <p:spTgt spid="4">
+                                            <p:txEl>
+                                              <p:pRg st="3" end="3"/>
+                                            </p:txEl>
+                                          </p:spTgt>
+                                        </p:tgtEl>
+                                      </p:cBhvr>
+                                    </p:animEffect>
+                                  </p:childTnLst>
+                                </p:cTn>
+                              </p:par>
+                            </p:childTnLst>
+                          </p:cTn>
+                        </p:par>
+                      </p:childTnLst>
+                    </p:cTn>
+                  </p:par>
+                  <p:par>
+                    <p:cTn id="23" fill="hold">
+                      <p:stCondLst>
+                        <p:cond delay="indefinite"/>
+                      </p:stCondLst>
+                      <p:childTnLst>
+                        <p:par>
+                          <p:cTn id="24" fill="hold">
+                            <p:stCondLst>
+                              <p:cond delay="0"/>
+                            </p:stCondLst>
+                            <p:childTnLst>
+                              <p:par>
+                                <p:cTn id="25" presetID="10" presetClass="entr" presetSubtype="0" fill="hold" nodeType="clickEffect">
+                                  <p:stCondLst>
+                                    <p:cond delay="0"/>
+                                  </p:stCondLst>
+                                  <p:childTnLst>
+                                    <p:set>
+                                      <p:cBhvr>
+                                        <p:cTn id="26" dur="1" fill="hold">
+                                          <p:stCondLst>
+                                            <p:cond delay="0"/>
+                                          </p:stCondLst>
+                                        </p:cTn>
+                                        <p:tgtEl>
+                                          <p:spTgt spid="4">
+                                            <p:txEl>
+                                              <p:pRg st="4" end="4"/>
+                                            </p:txEl>
+                                          </p:spTgt>
+                                        </p:tgtEl>
+                                        <p:attrNameLst>
+                                          <p:attrName>style.visibility</p:attrName>
+                                        </p:attrNameLst>
+                                      </p:cBhvr>
+                                      <p:to>
+                                        <p:strVal val="visible"/>
+                                      </p:to>
+                                    </p:set>
+                                    <p:animEffect transition="in" filter="fade">
+                                      <p:cBhvr>
+                                        <p:cTn id="27" dur="500"/>
+                                        <p:tgtEl>
+                                          <p:spTgt spid="4">
+                                            <p:txEl>
+                                              <p:pRg st="4" end="4"/>
+                                            </p:txEl>
+                                          </p:spTgt>
+                                        </p:tgtEl>
+                                      </p:cBhvr>
+                                    </p:animEffect>
+                                  </p:childTnLst>
+                                </p:cTn>
+                              </p:par>
+                            </p:childTnLst>
+                          </p:cTn>
+                        </p:par>
+                      </p:childTnLst>
+                    </p:cTn>
+                  </p:par>
+                </p:childTnLst>
+              </p:cTn>
+              <p:prevCondLst>
+                <p:cond evt="onPrev" delay="0">
+                  <p:tgtEl>
+                    <p:sldTgt/>
+                  </p:tgtEl>
+                </p:cond>
+              </p:prevCondLst>
+              <p:nextCondLst>
+                <p:cond evt="onNext" delay="0">
+                  <p:tgtEl>
+                    <p:sldTgt/>
+                  </p:tgtEl>
+                </p:cond>
+              </p:nextCondLst>
+            </p:seq>
+          </p:childTnLst>
+        </p:cTn>
+      </p:par>
+    </p:tnLst>
+  </p:timing>
 </p:sld>
 </file>
 
@@ -7739,20 +8343,18 @@
         </p:nvSpPr>
         <p:spPr>
           <a:xfrm>
-            <a:off x="2362200" y="2209800"/>
-            <a:ext cx="6019800" cy="1435608"/>
-          </a:xfrm>
-        </p:spPr>
-        <p:txBody>
-          <a:bodyPr>
-            <a:normAutofit/>
-          </a:bodyPr>
+            <a:off x="2388972" y="304800"/>
+            <a:ext cx="4818888" cy="1066800"/>
+          </a:xfrm>
+        </p:spPr>
+        <p:txBody>
+          <a:bodyPr/>
           <a:lstStyle/>
           <a:p>
             <a:pPr algn="l"/>
             <a:r>
               <a:rPr lang="en-US" dirty="0" smtClean="0"/>
-              <a:t>Any questions?</a:t>
+              <a:t>Contributions</a:t>
             </a:r>
             <a:endParaRPr lang="en-US" dirty="0"/>
           </a:p>
@@ -7770,40 +8372,62 @@
         </p:nvSpPr>
         <p:spPr>
           <a:xfrm>
-            <a:off x="1295400" y="1752600"/>
-            <a:ext cx="6111290" cy="3927806"/>
-          </a:xfrm>
-        </p:spPr>
-        <p:txBody>
-          <a:bodyPr/>
+            <a:off x="1178916" y="1676400"/>
+            <a:ext cx="7238999" cy="4385007"/>
+          </a:xfrm>
+        </p:spPr>
+        <p:txBody>
+          <a:bodyPr>
+            <a:normAutofit/>
+          </a:bodyPr>
           <a:lstStyle/>
           <a:p>
-            <a:pPr marL="285750" indent="-285750" algn="l">
-              <a:buFont typeface="Arial" panose="020B0604020202020204" pitchFamily="34" charset="0"/>
-              <a:buChar char="•"/>
-            </a:pPr>
-            <a:endParaRPr lang="en-US" dirty="0"/>
-          </a:p>
-          <a:p>
-            <a:pPr marL="285750" indent="-285750" algn="l">
-              <a:buFont typeface="Arial" panose="020B0604020202020204" pitchFamily="34" charset="0"/>
-              <a:buChar char="•"/>
-            </a:pPr>
-            <a:endParaRPr lang="en-US" dirty="0" smtClean="0"/>
-          </a:p>
-          <a:p>
-            <a:pPr marL="285750" indent="-285750" algn="l">
-              <a:buFont typeface="Arial" panose="020B0604020202020204" pitchFamily="34" charset="0"/>
-              <a:buChar char="•"/>
-            </a:pPr>
-            <a:endParaRPr lang="en-US" dirty="0"/>
+            <a:pPr algn="l"/>
+            <a:r>
+              <a:rPr lang="en-US" sz="2500" dirty="0" smtClean="0"/>
+              <a:t>Jasper: 2 mini-games, credits &amp; presentation.</a:t>
+            </a:r>
+          </a:p>
+          <a:p>
+            <a:pPr algn="l"/>
+            <a:r>
+              <a:rPr lang="en-US" sz="2500" dirty="0" smtClean="0"/>
+              <a:t>Kin </a:t>
+            </a:r>
+            <a:r>
+              <a:rPr lang="en-US" sz="2500" dirty="0" err="1" smtClean="0"/>
+              <a:t>Lek</a:t>
+            </a:r>
+            <a:r>
+              <a:rPr lang="en-US" sz="2500" dirty="0" smtClean="0"/>
+              <a:t>: 2 mini-games, in-game menu, ranking system &amp; trailer.</a:t>
+            </a:r>
+          </a:p>
+          <a:p>
+            <a:pPr algn="l"/>
+            <a:r>
+              <a:rPr lang="en-US" sz="2500" dirty="0" smtClean="0"/>
+              <a:t>Ivan: 4 mini-games, the random game mode and the game document.</a:t>
+            </a:r>
+          </a:p>
+          <a:p>
+            <a:pPr algn="l"/>
+            <a:r>
+              <a:rPr lang="en-US" sz="2500" dirty="0" err="1" smtClean="0"/>
+              <a:t>Shafik</a:t>
+            </a:r>
+            <a:r>
+              <a:rPr lang="en-US" sz="2500" dirty="0" smtClean="0"/>
+              <a:t>: Framework Edits(stopped flickering on the screen and support multiple file streams),created the game controls and 2 mini-games.</a:t>
+            </a:r>
+            <a:endParaRPr lang="en-US" sz="2500" dirty="0"/>
           </a:p>
         </p:txBody>
       </p:sp>
     </p:spTree>
     <p:extLst>
       <p:ext uri="{BB962C8B-B14F-4D97-AF65-F5344CB8AC3E}">
-        <p14:creationId xmlns:p14="http://schemas.microsoft.com/office/powerpoint/2010/main" val="3040278643"/>
+        <p14:creationId xmlns:p14="http://schemas.microsoft.com/office/powerpoint/2010/main" val="788192526"/>
       </p:ext>
     </p:extLst>
   </p:cSld>
@@ -7811,6 +8435,280 @@
     <a:masterClrMapping/>
   </p:clrMapOvr>
   <p:transition/>
+  <p:timing>
+    <p:tnLst>
+      <p:par>
+        <p:cTn id="1" dur="indefinite" restart="never" nodeType="tmRoot">
+          <p:childTnLst>
+            <p:seq concurrent="1" nextAc="seek">
+              <p:cTn id="2" dur="indefinite" nodeType="mainSeq">
+                <p:childTnLst>
+                  <p:par>
+                    <p:cTn id="3" fill="hold">
+                      <p:stCondLst>
+                        <p:cond delay="indefinite"/>
+                      </p:stCondLst>
+                      <p:childTnLst>
+                        <p:par>
+                          <p:cTn id="4" fill="hold">
+                            <p:stCondLst>
+                              <p:cond delay="0"/>
+                            </p:stCondLst>
+                            <p:childTnLst>
+                              <p:par>
+                                <p:cTn id="5" presetID="10" presetClass="entr" presetSubtype="0" fill="hold" nodeType="clickEffect">
+                                  <p:stCondLst>
+                                    <p:cond delay="0"/>
+                                  </p:stCondLst>
+                                  <p:childTnLst>
+                                    <p:set>
+                                      <p:cBhvr>
+                                        <p:cTn id="6" dur="1" fill="hold">
+                                          <p:stCondLst>
+                                            <p:cond delay="0"/>
+                                          </p:stCondLst>
+                                        </p:cTn>
+                                        <p:tgtEl>
+                                          <p:spTgt spid="4">
+                                            <p:txEl>
+                                              <p:pRg st="0" end="0"/>
+                                            </p:txEl>
+                                          </p:spTgt>
+                                        </p:tgtEl>
+                                        <p:attrNameLst>
+                                          <p:attrName>style.visibility</p:attrName>
+                                        </p:attrNameLst>
+                                      </p:cBhvr>
+                                      <p:to>
+                                        <p:strVal val="visible"/>
+                                      </p:to>
+                                    </p:set>
+                                    <p:animEffect transition="in" filter="fade">
+                                      <p:cBhvr>
+                                        <p:cTn id="7" dur="500"/>
+                                        <p:tgtEl>
+                                          <p:spTgt spid="4">
+                                            <p:txEl>
+                                              <p:pRg st="0" end="0"/>
+                                            </p:txEl>
+                                          </p:spTgt>
+                                        </p:tgtEl>
+                                      </p:cBhvr>
+                                    </p:animEffect>
+                                  </p:childTnLst>
+                                </p:cTn>
+                              </p:par>
+                            </p:childTnLst>
+                          </p:cTn>
+                        </p:par>
+                      </p:childTnLst>
+                    </p:cTn>
+                  </p:par>
+                  <p:par>
+                    <p:cTn id="8" fill="hold">
+                      <p:stCondLst>
+                        <p:cond delay="indefinite"/>
+                      </p:stCondLst>
+                      <p:childTnLst>
+                        <p:par>
+                          <p:cTn id="9" fill="hold">
+                            <p:stCondLst>
+                              <p:cond delay="0"/>
+                            </p:stCondLst>
+                            <p:childTnLst>
+                              <p:par>
+                                <p:cTn id="10" presetID="10" presetClass="entr" presetSubtype="0" fill="hold" nodeType="clickEffect">
+                                  <p:stCondLst>
+                                    <p:cond delay="0"/>
+                                  </p:stCondLst>
+                                  <p:childTnLst>
+                                    <p:set>
+                                      <p:cBhvr>
+                                        <p:cTn id="11" dur="1" fill="hold">
+                                          <p:stCondLst>
+                                            <p:cond delay="0"/>
+                                          </p:stCondLst>
+                                        </p:cTn>
+                                        <p:tgtEl>
+                                          <p:spTgt spid="4">
+                                            <p:txEl>
+                                              <p:pRg st="1" end="1"/>
+                                            </p:txEl>
+                                          </p:spTgt>
+                                        </p:tgtEl>
+                                        <p:attrNameLst>
+                                          <p:attrName>style.visibility</p:attrName>
+                                        </p:attrNameLst>
+                                      </p:cBhvr>
+                                      <p:to>
+                                        <p:strVal val="visible"/>
+                                      </p:to>
+                                    </p:set>
+                                    <p:animEffect transition="in" filter="fade">
+                                      <p:cBhvr>
+                                        <p:cTn id="12" dur="500"/>
+                                        <p:tgtEl>
+                                          <p:spTgt spid="4">
+                                            <p:txEl>
+                                              <p:pRg st="1" end="1"/>
+                                            </p:txEl>
+                                          </p:spTgt>
+                                        </p:tgtEl>
+                                      </p:cBhvr>
+                                    </p:animEffect>
+                                  </p:childTnLst>
+                                </p:cTn>
+                              </p:par>
+                            </p:childTnLst>
+                          </p:cTn>
+                        </p:par>
+                      </p:childTnLst>
+                    </p:cTn>
+                  </p:par>
+                  <p:par>
+                    <p:cTn id="13" fill="hold">
+                      <p:stCondLst>
+                        <p:cond delay="indefinite"/>
+                      </p:stCondLst>
+                      <p:childTnLst>
+                        <p:par>
+                          <p:cTn id="14" fill="hold">
+                            <p:stCondLst>
+                              <p:cond delay="0"/>
+                            </p:stCondLst>
+                            <p:childTnLst>
+                              <p:par>
+                                <p:cTn id="15" presetID="10" presetClass="entr" presetSubtype="0" fill="hold" nodeType="clickEffect">
+                                  <p:stCondLst>
+                                    <p:cond delay="0"/>
+                                  </p:stCondLst>
+                                  <p:childTnLst>
+                                    <p:set>
+                                      <p:cBhvr>
+                                        <p:cTn id="16" dur="1" fill="hold">
+                                          <p:stCondLst>
+                                            <p:cond delay="0"/>
+                                          </p:stCondLst>
+                                        </p:cTn>
+                                        <p:tgtEl>
+                                          <p:spTgt spid="4">
+                                            <p:txEl>
+                                              <p:pRg st="2" end="2"/>
+                                            </p:txEl>
+                                          </p:spTgt>
+                                        </p:tgtEl>
+                                        <p:attrNameLst>
+                                          <p:attrName>style.visibility</p:attrName>
+                                        </p:attrNameLst>
+                                      </p:cBhvr>
+                                      <p:to>
+                                        <p:strVal val="visible"/>
+                                      </p:to>
+                                    </p:set>
+                                    <p:animEffect transition="in" filter="fade">
+                                      <p:cBhvr>
+                                        <p:cTn id="17" dur="500"/>
+                                        <p:tgtEl>
+                                          <p:spTgt spid="4">
+                                            <p:txEl>
+                                              <p:pRg st="2" end="2"/>
+                                            </p:txEl>
+                                          </p:spTgt>
+                                        </p:tgtEl>
+                                      </p:cBhvr>
+                                    </p:animEffect>
+                                  </p:childTnLst>
+                                </p:cTn>
+                              </p:par>
+                            </p:childTnLst>
+                          </p:cTn>
+                        </p:par>
+                      </p:childTnLst>
+                    </p:cTn>
+                  </p:par>
+                  <p:par>
+                    <p:cTn id="18" fill="hold">
+                      <p:stCondLst>
+                        <p:cond delay="indefinite"/>
+                      </p:stCondLst>
+                      <p:childTnLst>
+                        <p:par>
+                          <p:cTn id="19" fill="hold">
+                            <p:stCondLst>
+                              <p:cond delay="0"/>
+                            </p:stCondLst>
+                            <p:childTnLst>
+                              <p:par>
+                                <p:cTn id="20" presetID="10" presetClass="entr" presetSubtype="0" fill="hold" nodeType="clickEffect">
+                                  <p:stCondLst>
+                                    <p:cond delay="0"/>
+                                  </p:stCondLst>
+                                  <p:childTnLst>
+                                    <p:set>
+                                      <p:cBhvr>
+                                        <p:cTn id="21" dur="1" fill="hold">
+                                          <p:stCondLst>
+                                            <p:cond delay="0"/>
+                                          </p:stCondLst>
+                                        </p:cTn>
+                                        <p:tgtEl>
+                                          <p:spTgt spid="4">
+                                            <p:txEl>
+                                              <p:pRg st="3" end="3"/>
+                                            </p:txEl>
+                                          </p:spTgt>
+                                        </p:tgtEl>
+                                        <p:attrNameLst>
+                                          <p:attrName>style.visibility</p:attrName>
+                                        </p:attrNameLst>
+                                      </p:cBhvr>
+                                      <p:to>
+                                        <p:strVal val="visible"/>
+                                      </p:to>
+                                    </p:set>
+                                    <p:animEffect transition="in" filter="fade">
+                                      <p:cBhvr>
+                                        <p:cTn id="22" dur="500"/>
+                                        <p:tgtEl>
+                                          <p:spTgt spid="4">
+                                            <p:txEl>
+                                              <p:pRg st="3" end="3"/>
+                                            </p:txEl>
+                                          </p:spTgt>
+                                        </p:tgtEl>
+                                      </p:cBhvr>
+                                    </p:animEffect>
+                                  </p:childTnLst>
+                                </p:cTn>
+                              </p:par>
+                            </p:childTnLst>
+                          </p:cTn>
+                        </p:par>
+                      </p:childTnLst>
+                    </p:cTn>
+                  </p:par>
+                </p:childTnLst>
+              </p:cTn>
+              <p:prevCondLst>
+                <p:cond evt="onPrev" delay="0">
+                  <p:tgtEl>
+                    <p:sldTgt/>
+                  </p:tgtEl>
+                </p:cond>
+              </p:prevCondLst>
+              <p:nextCondLst>
+                <p:cond evt="onNext" delay="0">
+                  <p:tgtEl>
+                    <p:sldTgt/>
+                  </p:tgtEl>
+                </p:cond>
+              </p:nextCondLst>
+            </p:seq>
+          </p:childTnLst>
+        </p:cTn>
+      </p:par>
+    </p:tnLst>
+  </p:timing>
 </p:sld>
 </file>
 
@@ -7843,6 +8741,210 @@
         </p:nvSpPr>
         <p:spPr>
           <a:xfrm>
+            <a:off x="1562100" y="152400"/>
+            <a:ext cx="6019800" cy="1435608"/>
+          </a:xfrm>
+        </p:spPr>
+        <p:txBody>
+          <a:bodyPr>
+            <a:normAutofit/>
+          </a:bodyPr>
+          <a:lstStyle/>
+          <a:p>
+            <a:pPr algn="ctr"/>
+            <a:r>
+              <a:rPr lang="en-US" dirty="0" smtClean="0"/>
+              <a:t>Gantt Chart</a:t>
+            </a:r>
+            <a:endParaRPr lang="en-US" dirty="0"/>
+          </a:p>
+        </p:txBody>
+      </p:sp>
+      <p:pic>
+        <p:nvPicPr>
+          <p:cNvPr id="3" name="Picture 2"/>
+          <p:cNvPicPr>
+            <a:picLocks noChangeAspect="1"/>
+          </p:cNvPicPr>
+          <p:nvPr/>
+        </p:nvPicPr>
+        <p:blipFill>
+          <a:blip r:embed="rId2"/>
+          <a:stretch>
+            <a:fillRect/>
+          </a:stretch>
+        </p:blipFill>
+        <p:spPr>
+          <a:xfrm>
+            <a:off x="381000" y="1828800"/>
+            <a:ext cx="8382000" cy="4588670"/>
+          </a:xfrm>
+          <a:prstGeom prst="rect">
+            <a:avLst/>
+          </a:prstGeom>
+        </p:spPr>
+      </p:pic>
+    </p:spTree>
+    <p:extLst>
+      <p:ext uri="{BB962C8B-B14F-4D97-AF65-F5344CB8AC3E}">
+        <p14:creationId xmlns:p14="http://schemas.microsoft.com/office/powerpoint/2010/main" val="971826567"/>
+      </p:ext>
+    </p:extLst>
+  </p:cSld>
+  <p:clrMapOvr>
+    <a:masterClrMapping/>
+  </p:clrMapOvr>
+  <p:transition/>
+  <p:timing>
+    <p:tnLst>
+      <p:par>
+        <p:cTn id="1" dur="indefinite" restart="never" nodeType="tmRoot"/>
+      </p:par>
+    </p:tnLst>
+  </p:timing>
+</p:sld>
+</file>
+
+<file path=ppt/slides/slide8.xml><?xml version="1.0" encoding="utf-8"?>
+<p:sld xmlns:a="http://schemas.openxmlformats.org/drawingml/2006/main" xmlns:r="http://schemas.openxmlformats.org/officeDocument/2006/relationships" xmlns:p="http://schemas.openxmlformats.org/presentationml/2006/main">
+  <p:cSld>
+    <p:spTree>
+      <p:nvGrpSpPr>
+        <p:cNvPr id="1" name=""/>
+        <p:cNvGrpSpPr/>
+        <p:nvPr/>
+      </p:nvGrpSpPr>
+      <p:grpSpPr>
+        <a:xfrm>
+          <a:off x="0" y="0"/>
+          <a:ext cx="0" cy="0"/>
+          <a:chOff x="0" y="0"/>
+          <a:chExt cx="0" cy="0"/>
+        </a:xfrm>
+      </p:grpSpPr>
+      <p:sp>
+        <p:nvSpPr>
+          <p:cNvPr id="2" name="Title 1"/>
+          <p:cNvSpPr>
+            <a:spLocks noGrp="1"/>
+          </p:cNvSpPr>
+          <p:nvPr>
+            <p:ph type="title"/>
+          </p:nvPr>
+        </p:nvSpPr>
+        <p:spPr>
+          <a:xfrm>
+            <a:off x="2362200" y="2209800"/>
+            <a:ext cx="6019800" cy="1435608"/>
+          </a:xfrm>
+        </p:spPr>
+        <p:txBody>
+          <a:bodyPr>
+            <a:normAutofit/>
+          </a:bodyPr>
+          <a:lstStyle/>
+          <a:p>
+            <a:pPr algn="l"/>
+            <a:r>
+              <a:rPr lang="en-US" dirty="0" smtClean="0"/>
+              <a:t>Any questions?</a:t>
+            </a:r>
+            <a:endParaRPr lang="en-US" dirty="0"/>
+          </a:p>
+        </p:txBody>
+      </p:sp>
+      <p:sp>
+        <p:nvSpPr>
+          <p:cNvPr id="4" name="Text Placeholder 3"/>
+          <p:cNvSpPr>
+            <a:spLocks noGrp="1"/>
+          </p:cNvSpPr>
+          <p:nvPr>
+            <p:ph type="body" sz="half" idx="2"/>
+          </p:nvPr>
+        </p:nvSpPr>
+        <p:spPr>
+          <a:xfrm>
+            <a:off x="1295400" y="1752600"/>
+            <a:ext cx="6111290" cy="3927806"/>
+          </a:xfrm>
+        </p:spPr>
+        <p:txBody>
+          <a:bodyPr/>
+          <a:lstStyle/>
+          <a:p>
+            <a:pPr marL="285750" indent="-285750" algn="l">
+              <a:buFont typeface="Arial" panose="020B0604020202020204" pitchFamily="34" charset="0"/>
+              <a:buChar char="•"/>
+            </a:pPr>
+            <a:endParaRPr lang="en-US" dirty="0"/>
+          </a:p>
+          <a:p>
+            <a:pPr marL="285750" indent="-285750" algn="l">
+              <a:buFont typeface="Arial" panose="020B0604020202020204" pitchFamily="34" charset="0"/>
+              <a:buChar char="•"/>
+            </a:pPr>
+            <a:endParaRPr lang="en-US" dirty="0" smtClean="0"/>
+          </a:p>
+          <a:p>
+            <a:pPr marL="285750" indent="-285750" algn="l">
+              <a:buFont typeface="Arial" panose="020B0604020202020204" pitchFamily="34" charset="0"/>
+              <a:buChar char="•"/>
+            </a:pPr>
+            <a:endParaRPr lang="en-US" dirty="0"/>
+          </a:p>
+        </p:txBody>
+      </p:sp>
+    </p:spTree>
+    <p:extLst>
+      <p:ext uri="{BB962C8B-B14F-4D97-AF65-F5344CB8AC3E}">
+        <p14:creationId xmlns:p14="http://schemas.microsoft.com/office/powerpoint/2010/main" val="3040278643"/>
+      </p:ext>
+    </p:extLst>
+  </p:cSld>
+  <p:clrMapOvr>
+    <a:masterClrMapping/>
+  </p:clrMapOvr>
+  <p:transition/>
+  <p:timing>
+    <p:tnLst>
+      <p:par>
+        <p:cTn id="1" dur="indefinite" restart="never" nodeType="tmRoot"/>
+      </p:par>
+    </p:tnLst>
+  </p:timing>
+</p:sld>
+</file>
+
+<file path=ppt/slides/slide9.xml><?xml version="1.0" encoding="utf-8"?>
+<p:sld xmlns:a="http://schemas.openxmlformats.org/drawingml/2006/main" xmlns:r="http://schemas.openxmlformats.org/officeDocument/2006/relationships" xmlns:p="http://schemas.openxmlformats.org/presentationml/2006/main">
+  <p:cSld>
+    <p:spTree>
+      <p:nvGrpSpPr>
+        <p:cNvPr id="1" name=""/>
+        <p:cNvGrpSpPr/>
+        <p:nvPr/>
+      </p:nvGrpSpPr>
+      <p:grpSpPr>
+        <a:xfrm>
+          <a:off x="0" y="0"/>
+          <a:ext cx="0" cy="0"/>
+          <a:chOff x="0" y="0"/>
+          <a:chExt cx="0" cy="0"/>
+        </a:xfrm>
+      </p:grpSpPr>
+      <p:sp>
+        <p:nvSpPr>
+          <p:cNvPr id="2" name="Title 1"/>
+          <p:cNvSpPr>
+            <a:spLocks noGrp="1"/>
+          </p:cNvSpPr>
+          <p:nvPr>
+            <p:ph type="title"/>
+          </p:nvPr>
+        </p:nvSpPr>
+        <p:spPr>
+          <a:xfrm>
             <a:off x="2362200" y="2209800"/>
             <a:ext cx="6019800" cy="1435608"/>
           </a:xfrm>
@@ -7922,6 +9024,13 @@
     <a:masterClrMapping/>
   </p:clrMapOvr>
   <p:transition/>
+  <p:timing>
+    <p:tnLst>
+      <p:par>
+        <p:cTn id="1" dur="indefinite" restart="never" nodeType="tmRoot"/>
+      </p:par>
+    </p:tnLst>
+  </p:timing>
 </p:sld>
 </file>
 

</xml_diff>